<commit_message>
Color palette for logP analysis and testing ridge plots.
</commit_message>
<xml_diff>
--- a/analysis_of_logP_predictions/20191016_molecular_error_ridge_plots/color_palette.pptx
+++ b/analysis_of_logP_predictions/20191016_molecular_error_ridge_plots/color_palette.pptx
@@ -3136,7 +3136,7 @@
         </p:blipFill>
         <p:spPr>
           <a:xfrm>
-            <a:off x="547035" y="4855421"/>
+            <a:off x="547035" y="4794949"/>
             <a:ext cx="2133600" cy="215900"/>
           </a:xfrm>
           <a:prstGeom prst="rect">
@@ -3160,7 +3160,7 @@
         </p:blipFill>
         <p:spPr>
           <a:xfrm>
-            <a:off x="547035" y="5061403"/>
+            <a:off x="547035" y="4970695"/>
             <a:ext cx="2349500" cy="215900"/>
           </a:xfrm>
           <a:prstGeom prst="rect">
@@ -3184,7 +3184,7 @@
         </p:blipFill>
         <p:spPr>
           <a:xfrm>
-            <a:off x="531915" y="4378631"/>
+            <a:off x="531915" y="4439103"/>
             <a:ext cx="2133600" cy="203200"/>
           </a:xfrm>
           <a:prstGeom prst="rect">
@@ -3256,7 +3256,7 @@
         </p:blipFill>
         <p:spPr>
           <a:xfrm>
-            <a:off x="345945" y="4932157"/>
+            <a:off x="345945" y="4856567"/>
             <a:ext cx="419100" cy="63500"/>
           </a:xfrm>
           <a:prstGeom prst="rect">
@@ -3280,7 +3280,7 @@
         </p:blipFill>
         <p:spPr>
           <a:xfrm>
-            <a:off x="362265" y="5160147"/>
+            <a:off x="362265" y="5054321"/>
             <a:ext cx="419100" cy="63500"/>
           </a:xfrm>
           <a:prstGeom prst="rect">
@@ -3536,6 +3536,59 @@
           </a:prstGeom>
         </p:spPr>
       </p:pic>
+      <p:sp>
+        <p:nvSpPr>
+          <p:cNvPr id="61" name="Rectangle 60"/>
+          <p:cNvSpPr/>
+          <p:nvPr/>
+        </p:nvSpPr>
+        <p:spPr>
+          <a:xfrm>
+            <a:off x="6050954" y="1213008"/>
+            <a:ext cx="4572000" cy="1477328"/>
+          </a:xfrm>
+          <a:prstGeom prst="rect">
+            <a:avLst/>
+          </a:prstGeom>
+        </p:spPr>
+        <p:txBody>
+          <a:bodyPr>
+            <a:spAutoFit/>
+          </a:bodyPr>
+          <a:lstStyle/>
+          <a:p>
+            <a:r>
+              <a:rPr lang="mr-IN" dirty="0" smtClean="0"/>
+              <a:t>#zesty_color_palette </a:t>
+            </a:r>
+          </a:p>
+          <a:p>
+            <a:r>
+              <a:rPr lang="mr-IN" dirty="0" smtClean="0"/>
+              <a:t>color0 = "#0F2080"</a:t>
+            </a:r>
+          </a:p>
+          <a:p>
+            <a:r>
+              <a:rPr lang="mr-IN" dirty="0" smtClean="0"/>
+              <a:t>color1 = "#F5793A"</a:t>
+            </a:r>
+          </a:p>
+          <a:p>
+            <a:r>
+              <a:rPr lang="mr-IN" dirty="0" smtClean="0"/>
+              <a:t>color2 = "#85C0F9" </a:t>
+            </a:r>
+          </a:p>
+          <a:p>
+            <a:r>
+              <a:rPr lang="mr-IN" dirty="0" smtClean="0"/>
+              <a:t>color3 = "#A95AA1"</a:t>
+            </a:r>
+            <a:endParaRPr lang="en-US" dirty="0"/>
+          </a:p>
+        </p:txBody>
+      </p:sp>
     </p:spTree>
     <p:extLst>
       <p:ext uri="{BB962C8B-B14F-4D97-AF65-F5344CB8AC3E}">

</xml_diff>